<commit_message>
Added notes and that's it I guess
</commit_message>
<xml_diff>
--- a/Seminarium Dyplomowe/Seminarium dyplomowe - prezka 1.pptx
+++ b/Seminarium Dyplomowe/Seminarium dyplomowe - prezka 1.pptx
@@ -225,7 +225,7 @@
           </a:lstStyle>
           <a:p>
             <a:fld id="{8CD8396C-ABAC-4BA4-94EF-42561EB088F0}" type="datetimeFigureOut">
-              <a:t>12.03.2024</a:t>
+              <a:t>13.03.2024</a:t>
             </a:fld>
             <a:endParaRPr lang="pl-PL"/>
           </a:p>
@@ -1839,6 +1839,114 @@
           <a:bodyPr/>
           <a:lstStyle/>
           <a:p>
+            <a:pPr marL="0" marR="0" lvl="0" indent="0" algn="l" defTabSz="914400" rtl="0" eaLnBrk="1" fontAlgn="auto" latinLnBrk="0" hangingPunct="1">
+              <a:lnSpc>
+                <a:spcPct val="100000"/>
+              </a:lnSpc>
+              <a:spcBef>
+                <a:spcPts val="0"/>
+              </a:spcBef>
+              <a:spcAft>
+                <a:spcPts val="0"/>
+              </a:spcAft>
+              <a:buClrTx/>
+              <a:buSzTx/>
+              <a:buFontTx/>
+              <a:buNone/>
+              <a:tabLst/>
+              <a:defRPr/>
+            </a:pPr>
+            <a:r>
+              <a:rPr lang="en-US" b="0" i="0" u="none" strike="noStrike" dirty="0">
+                <a:solidFill>
+                  <a:srgbClr val="D3CFCA"/>
+                </a:solidFill>
+                <a:effectLst/>
+                <a:latin typeface="Arial" panose="020B0604020202020204" pitchFamily="34" charset="0"/>
+                <a:hlinkClick r:id="rId3"/>
+              </a:rPr>
+              <a:t>A </a:t>
+            </a:r>
+            <a:r>
+              <a:rPr lang="en-US" b="1" i="0" u="none" strike="noStrike" dirty="0">
+                <a:solidFill>
+                  <a:srgbClr val="D3CFCA"/>
+                </a:solidFill>
+                <a:effectLst/>
+                <a:latin typeface="Arial" panose="020B0604020202020204" pitchFamily="34" charset="0"/>
+                <a:hlinkClick r:id="rId3"/>
+              </a:rPr>
+              <a:t>Markov chain</a:t>
+            </a:r>
+            <a:r>
+              <a:rPr lang="en-US" b="0" i="0" u="none" strike="noStrike" dirty="0">
+                <a:solidFill>
+                  <a:srgbClr val="D3CFCA"/>
+                </a:solidFill>
+                <a:effectLst/>
+                <a:latin typeface="Arial" panose="020B0604020202020204" pitchFamily="34" charset="0"/>
+                <a:hlinkClick r:id="rId3"/>
+              </a:rPr>
+              <a:t> or </a:t>
+            </a:r>
+            <a:r>
+              <a:rPr lang="en-US" b="1" i="0" u="none" strike="noStrike" dirty="0">
+                <a:solidFill>
+                  <a:srgbClr val="D3CFCA"/>
+                </a:solidFill>
+                <a:effectLst/>
+                <a:latin typeface="Arial" panose="020B0604020202020204" pitchFamily="34" charset="0"/>
+                <a:hlinkClick r:id="rId3"/>
+              </a:rPr>
+              <a:t>Markov process</a:t>
+            </a:r>
+            <a:r>
+              <a:rPr lang="en-US" b="0" i="0" u="none" strike="noStrike" dirty="0">
+                <a:solidFill>
+                  <a:srgbClr val="D3CFCA"/>
+                </a:solidFill>
+                <a:effectLst/>
+                <a:latin typeface="Arial" panose="020B0604020202020204" pitchFamily="34" charset="0"/>
+                <a:hlinkClick r:id="rId3"/>
+              </a:rPr>
+              <a:t> is a stochastic model describing a sequence of possible events in which the probability of each event depends only on the state attained in the previous event</a:t>
+            </a:r>
+          </a:p>
+          <a:p>
+            <a:endParaRPr lang="pl-PL" dirty="0"/>
+          </a:p>
+          <a:p>
+            <a:r>
+              <a:rPr lang="en-US" b="0" i="0" dirty="0">
+                <a:solidFill>
+                  <a:srgbClr val="D3CFCA"/>
+                </a:solidFill>
+                <a:effectLst/>
+                <a:latin typeface="Arial" panose="020B0604020202020204" pitchFamily="34" charset="0"/>
+              </a:rPr>
+              <a:t>Markov decision processes are an extension of </a:t>
+            </a:r>
+            <a:r>
+              <a:rPr lang="en-US" b="0" i="0" u="none" strike="noStrike" dirty="0">
+                <a:solidFill>
+                  <a:srgbClr val="5C98D6"/>
+                </a:solidFill>
+                <a:effectLst/>
+                <a:latin typeface="Arial" panose="020B0604020202020204" pitchFamily="34" charset="0"/>
+                <a:hlinkClick r:id="rId3" tooltip="Markov chain"/>
+              </a:rPr>
+              <a:t>Markov chains</a:t>
+            </a:r>
+            <a:r>
+              <a:rPr lang="en-US" b="0" i="0" dirty="0">
+                <a:solidFill>
+                  <a:srgbClr val="D3CFCA"/>
+                </a:solidFill>
+                <a:effectLst/>
+                <a:latin typeface="Arial" panose="020B0604020202020204" pitchFamily="34" charset="0"/>
+              </a:rPr>
+              <a:t>; the difference is the addition of actions (allowing choice) and rewards (giving motivation). Conversely, if only one action exists for each state (e.g. "wait") and all rewards are the same (e.g. "zero"), a Markov decision process reduces to a Markov chain.</a:t>
+            </a:r>
             <a:endParaRPr lang="pl-PL" dirty="0"/>
           </a:p>
         </p:txBody>
@@ -1952,21 +2060,21 @@
                 <a:effectLst/>
                 <a:latin typeface="Arial" panose="020B0604020202020204" pitchFamily="34" charset="0"/>
               </a:rPr>
-              <a:t>The first, labeled </a:t>
-            </a:r>
-            <a:r>
-              <a:rPr lang="en-US" b="0" i="0" dirty="0" err="1">
+              <a:t>The first, labeled narrative</a:t>
+            </a:r>
+            <a:r>
+              <a:rPr lang="pl-PL" b="0" i="0" dirty="0">
                 <a:effectLst/>
                 <a:latin typeface="Arial" panose="020B0604020202020204" pitchFamily="34" charset="0"/>
               </a:rPr>
-              <a:t>narrativeunderstanding</a:t>
+              <a:t> </a:t>
             </a:r>
             <a:r>
               <a:rPr lang="en-US" b="0" i="0" dirty="0">
                 <a:effectLst/>
                 <a:latin typeface="Arial" panose="020B0604020202020204" pitchFamily="34" charset="0"/>
               </a:rPr>
-              <a:t>, </a:t>
+              <a:t>understanding, </a:t>
             </a:r>
             <a:r>
               <a:rPr lang="en-US" b="0" i="0" dirty="0" err="1">
@@ -2318,7 +2426,7 @@
           <a:p>
             <a:fld id="{C1C230AD-F4F3-4FE9-B5DC-14524810504B}" type="datetime1">
               <a:rPr lang="en-US" smtClean="0"/>
-              <a:t>3/12/2024</a:t>
+              <a:t>3/13/2024</a:t>
             </a:fld>
             <a:endParaRPr lang="en-US" dirty="0"/>
           </a:p>
@@ -2517,7 +2625,7 @@
           <a:p>
             <a:fld id="{CA80D0E1-0060-4E33-918D-74443940DBD1}" type="datetime1">
               <a:rPr lang="en-US" smtClean="0"/>
-              <a:t>3/12/2024</a:t>
+              <a:t>3/13/2024</a:t>
             </a:fld>
             <a:endParaRPr lang="en-US" dirty="0"/>
           </a:p>
@@ -2726,7 +2834,7 @@
           <a:p>
             <a:fld id="{07C2CEEC-64C0-4315-AB48-A796220B24F6}" type="datetime1">
               <a:rPr lang="en-US" smtClean="0"/>
-              <a:t>3/12/2024</a:t>
+              <a:t>3/13/2024</a:t>
             </a:fld>
             <a:endParaRPr lang="en-US" dirty="0"/>
           </a:p>
@@ -2925,7 +3033,7 @@
           <a:p>
             <a:fld id="{F0FED8BC-CC50-42E0-9F77-A0AEFA7AE5BE}" type="datetime1">
               <a:rPr lang="en-US" smtClean="0"/>
-              <a:t>3/12/2024</a:t>
+              <a:t>3/13/2024</a:t>
             </a:fld>
             <a:endParaRPr lang="en-US" dirty="0"/>
           </a:p>
@@ -3201,7 +3309,7 @@
           <a:p>
             <a:fld id="{06D33603-C174-431C-A298-C1535374BC98}" type="datetime1">
               <a:rPr lang="en-US" smtClean="0"/>
-              <a:t>3/12/2024</a:t>
+              <a:t>3/13/2024</a:t>
             </a:fld>
             <a:endParaRPr lang="en-US" dirty="0"/>
           </a:p>
@@ -3467,7 +3575,7 @@
           <a:p>
             <a:fld id="{EF6FB7F9-6027-42D3-AC12-020C81D32D0C}" type="datetime1">
               <a:rPr lang="en-US" smtClean="0"/>
-              <a:t>3/12/2024</a:t>
+              <a:t>3/13/2024</a:t>
             </a:fld>
             <a:endParaRPr lang="en-US" dirty="0"/>
           </a:p>
@@ -3880,7 +3988,7 @@
           <a:p>
             <a:fld id="{78578E6C-D9C1-4CBF-8DC5-DF7BEF9D70EB}" type="datetime1">
               <a:rPr lang="en-US" smtClean="0"/>
-              <a:t>3/12/2024</a:t>
+              <a:t>3/13/2024</a:t>
             </a:fld>
             <a:endParaRPr lang="en-US" dirty="0"/>
           </a:p>
@@ -4022,7 +4130,7 @@
           <a:p>
             <a:fld id="{3AA4D66F-B536-45DE-8824-9E1BD66100F1}" type="datetime1">
               <a:rPr lang="en-US" smtClean="0"/>
-              <a:t>3/12/2024</a:t>
+              <a:t>3/13/2024</a:t>
             </a:fld>
             <a:endParaRPr lang="en-US" dirty="0"/>
           </a:p>
@@ -4136,7 +4244,7 @@
           <a:p>
             <a:fld id="{8D928E82-AC80-4939-913A-7632E3C8A49A}" type="datetime1">
               <a:rPr lang="en-US" smtClean="0"/>
-              <a:t>3/12/2024</a:t>
+              <a:t>3/13/2024</a:t>
             </a:fld>
             <a:endParaRPr lang="en-US" dirty="0"/>
           </a:p>
@@ -4448,7 +4556,7 @@
           <a:p>
             <a:fld id="{5FC13834-24A8-4A55-9F4B-F546D1E59BCE}" type="datetime1">
               <a:rPr lang="en-US" smtClean="0"/>
-              <a:t>3/12/2024</a:t>
+              <a:t>3/13/2024</a:t>
             </a:fld>
             <a:endParaRPr lang="en-US" dirty="0"/>
           </a:p>
@@ -4737,7 +4845,7 @@
           <a:p>
             <a:fld id="{3A6A2DFA-2BB7-4CB1-B921-27E29D2B329F}" type="datetime1">
               <a:rPr lang="en-US" smtClean="0"/>
-              <a:t>3/12/2024</a:t>
+              <a:t>3/13/2024</a:t>
             </a:fld>
             <a:endParaRPr lang="en-US" dirty="0"/>
           </a:p>
@@ -4979,7 +5087,7 @@
           <a:p>
             <a:fld id="{69CA22BB-4468-498D-B93B-9EB94AB20A84}" type="datetime1">
               <a:rPr lang="en-US" smtClean="0"/>
-              <a:t>3/12/2024</a:t>
+              <a:t>3/13/2024</a:t>
             </a:fld>
             <a:endParaRPr lang="en-US" dirty="0"/>
           </a:p>

</xml_diff>